<commit_message>
team quest 2 - game play
</commit_message>
<xml_diff>
--- a/액션&경영 RPG/게임플레이.pptx
+++ b/액션&경영 RPG/게임플레이.pptx
@@ -108,6 +108,11 @@
       </a:defRPr>
     </a:lvl9pPr>
   </p:defaultTextStyle>
+  <p:extLst>
+    <p:ext uri="{EFAFB233-063F-42B5-8137-9DF3F51BA10A}">
+      <p15:sldGuideLst xmlns:p15="http://schemas.microsoft.com/office/powerpoint/2012/main"/>
+    </p:ext>
+  </p:extLst>
 </p:presentation>
 </file>
 
@@ -193,7 +198,7 @@
           <a:p>
             <a:fld id="{B7F3F2A0-9C1C-4C9B-9E56-5CB19D1D757D}" type="datetimeFigureOut">
               <a:rPr lang="ko-KR" altLang="en-US" smtClean="0"/>
-              <a:t>2024-07-30</a:t>
+              <a:t>2024-07-31</a:t>
             </a:fld>
             <a:endParaRPr lang="ko-KR" altLang="en-US"/>
           </a:p>
@@ -691,7 +696,7 @@
           <a:p>
             <a:fld id="{8BD990B8-C5BC-4952-9217-139FE792DABA}" type="datetimeFigureOut">
               <a:rPr lang="ko-KR" altLang="en-US" smtClean="0"/>
-              <a:t>2024-07-30</a:t>
+              <a:t>2024-07-31</a:t>
             </a:fld>
             <a:endParaRPr lang="ko-KR" altLang="en-US"/>
           </a:p>
@@ -889,7 +894,7 @@
           <a:p>
             <a:fld id="{8BD990B8-C5BC-4952-9217-139FE792DABA}" type="datetimeFigureOut">
               <a:rPr lang="ko-KR" altLang="en-US" smtClean="0"/>
-              <a:t>2024-07-30</a:t>
+              <a:t>2024-07-31</a:t>
             </a:fld>
             <a:endParaRPr lang="ko-KR" altLang="en-US"/>
           </a:p>
@@ -1097,7 +1102,7 @@
           <a:p>
             <a:fld id="{8BD990B8-C5BC-4952-9217-139FE792DABA}" type="datetimeFigureOut">
               <a:rPr lang="ko-KR" altLang="en-US" smtClean="0"/>
-              <a:t>2024-07-30</a:t>
+              <a:t>2024-07-31</a:t>
             </a:fld>
             <a:endParaRPr lang="ko-KR" altLang="en-US"/>
           </a:p>
@@ -1295,7 +1300,7 @@
           <a:p>
             <a:fld id="{8BD990B8-C5BC-4952-9217-139FE792DABA}" type="datetimeFigureOut">
               <a:rPr lang="ko-KR" altLang="en-US" smtClean="0"/>
-              <a:t>2024-07-30</a:t>
+              <a:t>2024-07-31</a:t>
             </a:fld>
             <a:endParaRPr lang="ko-KR" altLang="en-US"/>
           </a:p>
@@ -1570,7 +1575,7 @@
           <a:p>
             <a:fld id="{8BD990B8-C5BC-4952-9217-139FE792DABA}" type="datetimeFigureOut">
               <a:rPr lang="ko-KR" altLang="en-US" smtClean="0"/>
-              <a:t>2024-07-30</a:t>
+              <a:t>2024-07-31</a:t>
             </a:fld>
             <a:endParaRPr lang="ko-KR" altLang="en-US"/>
           </a:p>
@@ -1835,7 +1840,7 @@
           <a:p>
             <a:fld id="{8BD990B8-C5BC-4952-9217-139FE792DABA}" type="datetimeFigureOut">
               <a:rPr lang="ko-KR" altLang="en-US" smtClean="0"/>
-              <a:t>2024-07-30</a:t>
+              <a:t>2024-07-31</a:t>
             </a:fld>
             <a:endParaRPr lang="ko-KR" altLang="en-US"/>
           </a:p>
@@ -2247,7 +2252,7 @@
           <a:p>
             <a:fld id="{8BD990B8-C5BC-4952-9217-139FE792DABA}" type="datetimeFigureOut">
               <a:rPr lang="ko-KR" altLang="en-US" smtClean="0"/>
-              <a:t>2024-07-30</a:t>
+              <a:t>2024-07-31</a:t>
             </a:fld>
             <a:endParaRPr lang="ko-KR" altLang="en-US"/>
           </a:p>
@@ -2388,7 +2393,7 @@
           <a:p>
             <a:fld id="{8BD990B8-C5BC-4952-9217-139FE792DABA}" type="datetimeFigureOut">
               <a:rPr lang="ko-KR" altLang="en-US" smtClean="0"/>
-              <a:t>2024-07-30</a:t>
+              <a:t>2024-07-31</a:t>
             </a:fld>
             <a:endParaRPr lang="ko-KR" altLang="en-US"/>
           </a:p>
@@ -2501,7 +2506,7 @@
           <a:p>
             <a:fld id="{8BD990B8-C5BC-4952-9217-139FE792DABA}" type="datetimeFigureOut">
               <a:rPr lang="ko-KR" altLang="en-US" smtClean="0"/>
-              <a:t>2024-07-30</a:t>
+              <a:t>2024-07-31</a:t>
             </a:fld>
             <a:endParaRPr lang="ko-KR" altLang="en-US"/>
           </a:p>
@@ -2812,7 +2817,7 @@
           <a:p>
             <a:fld id="{8BD990B8-C5BC-4952-9217-139FE792DABA}" type="datetimeFigureOut">
               <a:rPr lang="ko-KR" altLang="en-US" smtClean="0"/>
-              <a:t>2024-07-30</a:t>
+              <a:t>2024-07-31</a:t>
             </a:fld>
             <a:endParaRPr lang="ko-KR" altLang="en-US"/>
           </a:p>
@@ -3100,7 +3105,7 @@
           <a:p>
             <a:fld id="{8BD990B8-C5BC-4952-9217-139FE792DABA}" type="datetimeFigureOut">
               <a:rPr lang="ko-KR" altLang="en-US" smtClean="0"/>
-              <a:t>2024-07-30</a:t>
+              <a:t>2024-07-31</a:t>
             </a:fld>
             <a:endParaRPr lang="ko-KR" altLang="en-US"/>
           </a:p>
@@ -3341,7 +3346,7 @@
           <a:p>
             <a:fld id="{8BD990B8-C5BC-4952-9217-139FE792DABA}" type="datetimeFigureOut">
               <a:rPr lang="ko-KR" altLang="en-US" smtClean="0"/>
-              <a:t>2024-07-30</a:t>
+              <a:t>2024-07-31</a:t>
             </a:fld>
             <a:endParaRPr lang="ko-KR" altLang="en-US"/>
           </a:p>
@@ -3852,55 +3857,6 @@
             <a:r>
               <a:rPr lang="ko-KR" altLang="en-US" sz="1000" dirty="0"/>
               <a:t>시작</a:t>
-            </a:r>
-          </a:p>
-        </p:txBody>
-      </p:sp>
-      <p:sp>
-        <p:nvSpPr>
-          <p:cNvPr id="6" name="직사각형 5">
-            <a:extLst>
-              <a:ext uri="{FF2B5EF4-FFF2-40B4-BE49-F238E27FC236}">
-                <a16:creationId xmlns:a16="http://schemas.microsoft.com/office/drawing/2014/main" id="{0FAC94AC-CBF6-449B-B782-7C90E37EF1C0}"/>
-              </a:ext>
-            </a:extLst>
-          </p:cNvPr>
-          <p:cNvSpPr/>
-          <p:nvPr/>
-        </p:nvSpPr>
-        <p:spPr>
-          <a:xfrm>
-            <a:off x="1994188" y="1006765"/>
-            <a:ext cx="1045441" cy="341746"/>
-          </a:xfrm>
-          <a:prstGeom prst="rect">
-            <a:avLst/>
-          </a:prstGeom>
-        </p:spPr>
-        <p:style>
-          <a:lnRef idx="2">
-            <a:schemeClr val="accent1">
-              <a:shade val="50000"/>
-            </a:schemeClr>
-          </a:lnRef>
-          <a:fillRef idx="1">
-            <a:schemeClr val="accent1"/>
-          </a:fillRef>
-          <a:effectRef idx="0">
-            <a:schemeClr val="accent1"/>
-          </a:effectRef>
-          <a:fontRef idx="minor">
-            <a:schemeClr val="lt1"/>
-          </a:fontRef>
-        </p:style>
-        <p:txBody>
-          <a:bodyPr rtlCol="0" anchor="ctr"/>
-          <a:lstStyle/>
-          <a:p>
-            <a:pPr algn="ctr"/>
-            <a:r>
-              <a:rPr lang="ko-KR" altLang="en-US" sz="1000" dirty="0"/>
-              <a:t>튜토리얼</a:t>
             </a:r>
           </a:p>
         </p:txBody>

</xml_diff>